<commit_message>
Lesson 7: Generic Repository Design Pattern
</commit_message>
<xml_diff>
--- a/22_Entity Framwork.pptx
+++ b/22_Entity Framwork.pptx
@@ -5,7 +5,7 @@
     <p:sldMasterId id="2147483648" r:id="rId1"/>
   </p:sldMasterIdLst>
   <p:notesMasterIdLst>
-    <p:notesMasterId r:id="rId17"/>
+    <p:notesMasterId r:id="rId18"/>
   </p:notesMasterIdLst>
   <p:sldIdLst>
     <p:sldId id="260" r:id="rId2"/>
@@ -23,6 +23,7 @@
     <p:sldId id="268" r:id="rId14"/>
     <p:sldId id="270" r:id="rId15"/>
     <p:sldId id="269" r:id="rId16"/>
+    <p:sldId id="272" r:id="rId17"/>
   </p:sldIdLst>
   <p:sldSz cx="12192000" cy="6858000"/>
   <p:notesSz cx="6858000" cy="9144000"/>
@@ -10541,6 +10542,630 @@
     <p:extLst>
       <p:ext uri="{BB962C8B-B14F-4D97-AF65-F5344CB8AC3E}">
         <p14:creationId xmlns:p14="http://schemas.microsoft.com/office/powerpoint/2010/main" val="331335106"/>
+      </p:ext>
+    </p:extLst>
+  </p:cSld>
+  <p:clrMapOvr>
+    <a:masterClrMapping/>
+  </p:clrMapOvr>
+  <p:timing>
+    <p:tnLst>
+      <p:par>
+        <p:cTn id="1" dur="indefinite" restart="never" nodeType="tmRoot"/>
+      </p:par>
+    </p:tnLst>
+  </p:timing>
+</p:sld>
+</file>
+
+<file path=ppt/slides/slide16.xml><?xml version="1.0" encoding="utf-8"?>
+<p:sld xmlns:a="http://schemas.openxmlformats.org/drawingml/2006/main" xmlns:r="http://schemas.openxmlformats.org/officeDocument/2006/relationships" xmlns:p="http://schemas.openxmlformats.org/presentationml/2006/main">
+  <p:cSld>
+    <p:spTree>
+      <p:nvGrpSpPr>
+        <p:cNvPr id="1" name=""/>
+        <p:cNvGrpSpPr/>
+        <p:nvPr/>
+      </p:nvGrpSpPr>
+      <p:grpSpPr>
+        <a:xfrm>
+          <a:off x="0" y="0"/>
+          <a:ext cx="0" cy="0"/>
+          <a:chOff x="0" y="0"/>
+          <a:chExt cx="0" cy="0"/>
+        </a:xfrm>
+      </p:grpSpPr>
+      <p:sp>
+        <p:nvSpPr>
+          <p:cNvPr id="4" name="Title"/>
+          <p:cNvSpPr/>
+          <p:nvPr/>
+        </p:nvSpPr>
+        <p:spPr>
+          <a:xfrm>
+            <a:off x="4680338" y="139048"/>
+            <a:ext cx="2831353" cy="523220"/>
+          </a:xfrm>
+          <a:prstGeom prst="rect">
+            <a:avLst/>
+          </a:prstGeom>
+          <a:noFill/>
+          <a:ln>
+            <a:solidFill>
+              <a:schemeClr val="tx1"/>
+            </a:solidFill>
+            <a:prstDash val="dash"/>
+          </a:ln>
+        </p:spPr>
+        <p:txBody>
+          <a:bodyPr wrap="none" lIns="91440" tIns="45720" rIns="91440" bIns="45720">
+            <a:spAutoFit/>
+          </a:bodyPr>
+          <a:lstStyle/>
+          <a:p>
+            <a:pPr algn="ctr"/>
+            <a:r>
+              <a:rPr lang="en-US" sz="2800" b="1" dirty="0" smtClean="0">
+                <a:ln w="9525">
+                  <a:solidFill>
+                    <a:schemeClr val="bg1"/>
+                  </a:solidFill>
+                  <a:prstDash val="solid"/>
+                </a:ln>
+                <a:solidFill>
+                  <a:schemeClr val="bg2">
+                    <a:lumMod val="75000"/>
+                  </a:schemeClr>
+                </a:solidFill>
+                <a:effectLst>
+                  <a:outerShdw blurRad="12700" dist="38100" dir="2700000" algn="tl" rotWithShape="0">
+                    <a:schemeClr val="bg1">
+                      <a:lumMod val="50000"/>
+                    </a:schemeClr>
+                  </a:outerShdw>
+                </a:effectLst>
+              </a:rPr>
+              <a:t>Entity Framework</a:t>
+            </a:r>
+            <a:endParaRPr lang="en-US" sz="2800" b="1" cap="none" spc="0" dirty="0">
+              <a:ln w="9525">
+                <a:solidFill>
+                  <a:schemeClr val="bg1"/>
+                </a:solidFill>
+                <a:prstDash val="solid"/>
+              </a:ln>
+              <a:solidFill>
+                <a:schemeClr val="bg2">
+                  <a:lumMod val="75000"/>
+                </a:schemeClr>
+              </a:solidFill>
+              <a:effectLst>
+                <a:outerShdw blurRad="12700" dist="38100" dir="2700000" algn="tl" rotWithShape="0">
+                  <a:schemeClr val="bg1">
+                    <a:lumMod val="50000"/>
+                  </a:schemeClr>
+                </a:outerShdw>
+              </a:effectLst>
+            </a:endParaRPr>
+          </a:p>
+        </p:txBody>
+      </p:sp>
+      <p:sp>
+        <p:nvSpPr>
+          <p:cNvPr id="14" name="TextBox 13"/>
+          <p:cNvSpPr txBox="1"/>
+          <p:nvPr/>
+        </p:nvSpPr>
+        <p:spPr>
+          <a:xfrm>
+            <a:off x="6259716" y="2909803"/>
+            <a:ext cx="5336455" cy="2585323"/>
+          </a:xfrm>
+          <a:prstGeom prst="rect">
+            <a:avLst/>
+          </a:prstGeom>
+          <a:noFill/>
+        </p:spPr>
+        <p:txBody>
+          <a:bodyPr wrap="square" rtlCol="0">
+            <a:spAutoFit/>
+          </a:bodyPr>
+          <a:lstStyle/>
+          <a:p>
+            <a:pPr algn="r" rtl="1"/>
+            <a:r>
+              <a:rPr lang="ar-JO" b="1" dirty="0" smtClean="0"/>
+              <a:t>ثم طباعة هذه الاوامر</a:t>
+            </a:r>
+            <a:endParaRPr lang="en-US" b="1" dirty="0" smtClean="0"/>
+          </a:p>
+          <a:p>
+            <a:pPr algn="r" rtl="1"/>
+            <a:r>
+              <a:rPr lang="ar-JO" b="1" dirty="0" smtClean="0"/>
+              <a:t>1- </a:t>
+            </a:r>
+            <a:r>
+              <a:rPr lang="en-US" b="1" dirty="0" smtClean="0"/>
+              <a:t> </a:t>
+            </a:r>
+            <a:r>
+              <a:rPr lang="en-US" b="1" dirty="0"/>
+              <a:t>enable-migrations</a:t>
+            </a:r>
+            <a:endParaRPr lang="en-US" b="1" dirty="0" smtClean="0"/>
+          </a:p>
+          <a:p>
+            <a:pPr algn="r" rtl="1"/>
+            <a:r>
+              <a:rPr lang="ar-JO" dirty="0" smtClean="0"/>
+              <a:t>       إضافة مجلد </a:t>
+            </a:r>
+            <a:r>
+              <a:rPr lang="en-US" dirty="0" smtClean="0"/>
+              <a:t>Migrations</a:t>
+            </a:r>
+            <a:r>
+              <a:rPr lang="ar-JO" dirty="0" smtClean="0"/>
+              <a:t> مع كلاس </a:t>
+            </a:r>
+            <a:r>
+              <a:rPr lang="en-US" dirty="0" smtClean="0"/>
+              <a:t>Configuration</a:t>
+            </a:r>
+            <a:r>
+              <a:rPr lang="ar-JO" dirty="0"/>
+              <a:t> </a:t>
+            </a:r>
+            <a:r>
+              <a:rPr lang="ar-JO" dirty="0" smtClean="0"/>
+              <a:t>يحتوي على </a:t>
+            </a:r>
+            <a:r>
+              <a:rPr lang="en-US" dirty="0" smtClean="0"/>
+              <a:t>Seeding Function</a:t>
+            </a:r>
+            <a:endParaRPr lang="en-US" dirty="0" smtClean="0"/>
+          </a:p>
+          <a:p>
+            <a:pPr algn="r" rtl="1"/>
+            <a:r>
+              <a:rPr lang="ar-JO" b="1" dirty="0" smtClean="0"/>
+              <a:t>2- </a:t>
+            </a:r>
+            <a:r>
+              <a:rPr lang="en-US" b="1" dirty="0"/>
+              <a:t>Add-Migration </a:t>
+            </a:r>
+            <a:r>
+              <a:rPr lang="en-US" b="1" dirty="0" smtClean="0"/>
+              <a:t>“Name"</a:t>
+            </a:r>
+            <a:endParaRPr lang="en-US" b="1" dirty="0" smtClean="0"/>
+          </a:p>
+          <a:p>
+            <a:pPr lvl="1" algn="r" rtl="1"/>
+            <a:r>
+              <a:rPr lang="ar-JO" dirty="0" smtClean="0"/>
+              <a:t>لإضافة </a:t>
+            </a:r>
+            <a:r>
+              <a:rPr lang="en-US" dirty="0" err="1" smtClean="0"/>
+              <a:t>Migraiton</a:t>
+            </a:r>
+            <a:r>
+              <a:rPr lang="en-US" dirty="0" smtClean="0"/>
+              <a:t> </a:t>
+            </a:r>
+            <a:r>
+              <a:rPr lang="ar-JO" dirty="0"/>
+              <a:t> </a:t>
+            </a:r>
+            <a:r>
+              <a:rPr lang="ar-JO" dirty="0" smtClean="0"/>
+              <a:t>جديد</a:t>
+            </a:r>
+          </a:p>
+          <a:p>
+            <a:pPr algn="r" rtl="1"/>
+            <a:r>
+              <a:rPr lang="ar-JO" b="1" dirty="0" smtClean="0"/>
+              <a:t>3- </a:t>
+            </a:r>
+            <a:r>
+              <a:rPr lang="en-US" b="1" dirty="0" smtClean="0"/>
+              <a:t> </a:t>
+            </a:r>
+            <a:r>
+              <a:rPr lang="en-US" b="1" dirty="0"/>
+              <a:t>update-database</a:t>
+            </a:r>
+            <a:endParaRPr lang="en-US" b="1" dirty="0" smtClean="0"/>
+          </a:p>
+          <a:p>
+            <a:pPr lvl="1" algn="r" rtl="1"/>
+            <a:r>
+              <a:rPr lang="ar-JO" dirty="0" smtClean="0"/>
+              <a:t>لتحديث قاعدة البيانات لاخر </a:t>
+            </a:r>
+            <a:r>
+              <a:rPr lang="en-US" dirty="0" smtClean="0"/>
+              <a:t>migration</a:t>
+            </a:r>
+            <a:endParaRPr lang="en-US" dirty="0" smtClean="0"/>
+          </a:p>
+          <a:p>
+            <a:pPr algn="r" rtl="1"/>
+            <a:endParaRPr lang="en-US" dirty="0" smtClean="0"/>
+          </a:p>
+        </p:txBody>
+      </p:sp>
+      <p:sp>
+        <p:nvSpPr>
+          <p:cNvPr id="6" name="TextBox 5"/>
+          <p:cNvSpPr txBox="1"/>
+          <p:nvPr/>
+        </p:nvSpPr>
+        <p:spPr>
+          <a:xfrm>
+            <a:off x="7622980" y="1651496"/>
+            <a:ext cx="3973191" cy="923330"/>
+          </a:xfrm>
+          <a:prstGeom prst="rect">
+            <a:avLst/>
+          </a:prstGeom>
+          <a:noFill/>
+        </p:spPr>
+        <p:txBody>
+          <a:bodyPr wrap="square" rtlCol="0">
+            <a:spAutoFit/>
+          </a:bodyPr>
+          <a:lstStyle/>
+          <a:p>
+            <a:pPr algn="r" rtl="1"/>
+            <a:r>
+              <a:rPr lang="ar-JO" b="1" dirty="0" smtClean="0"/>
+              <a:t>لفتح اوامر </a:t>
+            </a:r>
+            <a:r>
+              <a:rPr lang="en-US" b="1" dirty="0" smtClean="0"/>
+              <a:t>Migrations</a:t>
+            </a:r>
+            <a:endParaRPr lang="en-US" dirty="0"/>
+          </a:p>
+          <a:p>
+            <a:pPr algn="r" rtl="1"/>
+            <a:r>
+              <a:rPr lang="en-US" dirty="0" smtClean="0"/>
+              <a:t>Tools -&gt; </a:t>
+            </a:r>
+            <a:r>
+              <a:rPr lang="en-US" dirty="0" err="1" smtClean="0"/>
+              <a:t>Nuget</a:t>
+            </a:r>
+            <a:r>
+              <a:rPr lang="en-US" dirty="0" smtClean="0"/>
+              <a:t> Package Manager -&gt; Package Manager Console </a:t>
+            </a:r>
+            <a:endParaRPr lang="ar-JO" dirty="0" smtClean="0"/>
+          </a:p>
+        </p:txBody>
+      </p:sp>
+      <p:sp>
+        <p:nvSpPr>
+          <p:cNvPr id="7" name="Title"/>
+          <p:cNvSpPr/>
+          <p:nvPr/>
+        </p:nvSpPr>
+        <p:spPr>
+          <a:xfrm>
+            <a:off x="5306832" y="662268"/>
+            <a:ext cx="1792478" cy="523220"/>
+          </a:xfrm>
+          <a:prstGeom prst="rect">
+            <a:avLst/>
+          </a:prstGeom>
+          <a:noFill/>
+          <a:ln>
+            <a:solidFill>
+              <a:schemeClr val="tx1"/>
+            </a:solidFill>
+            <a:prstDash val="dash"/>
+          </a:ln>
+        </p:spPr>
+        <p:txBody>
+          <a:bodyPr wrap="none" lIns="91440" tIns="45720" rIns="91440" bIns="45720">
+            <a:spAutoFit/>
+          </a:bodyPr>
+          <a:lstStyle/>
+          <a:p>
+            <a:pPr algn="ctr"/>
+            <a:r>
+              <a:rPr lang="en-US" sz="2800" b="1" dirty="0" smtClean="0">
+                <a:ln w="9525">
+                  <a:solidFill>
+                    <a:schemeClr val="bg1"/>
+                  </a:solidFill>
+                  <a:prstDash val="solid"/>
+                </a:ln>
+                <a:solidFill>
+                  <a:schemeClr val="bg2">
+                    <a:lumMod val="75000"/>
+                  </a:schemeClr>
+                </a:solidFill>
+                <a:effectLst>
+                  <a:outerShdw blurRad="12700" dist="38100" dir="2700000" algn="tl" rotWithShape="0">
+                    <a:schemeClr val="bg1">
+                      <a:lumMod val="50000"/>
+                    </a:schemeClr>
+                  </a:outerShdw>
+                </a:effectLst>
+              </a:rPr>
+              <a:t>Migrations</a:t>
+            </a:r>
+            <a:endParaRPr lang="en-US" sz="2800" b="1" cap="none" spc="0" dirty="0">
+              <a:ln w="9525">
+                <a:solidFill>
+                  <a:schemeClr val="bg1"/>
+                </a:solidFill>
+                <a:prstDash val="solid"/>
+              </a:ln>
+              <a:solidFill>
+                <a:schemeClr val="bg2">
+                  <a:lumMod val="75000"/>
+                </a:schemeClr>
+              </a:solidFill>
+              <a:effectLst>
+                <a:outerShdw blurRad="12700" dist="38100" dir="2700000" algn="tl" rotWithShape="0">
+                  <a:schemeClr val="bg1">
+                    <a:lumMod val="50000"/>
+                  </a:schemeClr>
+                </a:outerShdw>
+              </a:effectLst>
+            </a:endParaRPr>
+          </a:p>
+        </p:txBody>
+      </p:sp>
+      <p:sp>
+        <p:nvSpPr>
+          <p:cNvPr id="8" name="TextBox 7"/>
+          <p:cNvSpPr txBox="1"/>
+          <p:nvPr/>
+        </p:nvSpPr>
+        <p:spPr>
+          <a:xfrm>
+            <a:off x="278352" y="1524717"/>
+            <a:ext cx="5336455" cy="4524315"/>
+          </a:xfrm>
+          <a:prstGeom prst="rect">
+            <a:avLst/>
+          </a:prstGeom>
+          <a:noFill/>
+        </p:spPr>
+        <p:txBody>
+          <a:bodyPr wrap="square" rtlCol="0">
+            <a:spAutoFit/>
+          </a:bodyPr>
+          <a:lstStyle/>
+          <a:p>
+            <a:pPr algn="r" rtl="1"/>
+            <a:r>
+              <a:rPr lang="ar-JO" b="1" dirty="0" smtClean="0"/>
+              <a:t>ملاحظات:</a:t>
+            </a:r>
+            <a:endParaRPr lang="ar-JO" dirty="0" smtClean="0"/>
+          </a:p>
+          <a:p>
+            <a:pPr marL="285750" indent="-285750" algn="r" rtl="1">
+              <a:buFont typeface="Arial" panose="020B0604020202020204" pitchFamily="34" charset="0"/>
+              <a:buChar char="•"/>
+            </a:pPr>
+            <a:r>
+              <a:rPr lang="ar-JO" dirty="0" smtClean="0"/>
+              <a:t>اذا عملت </a:t>
+            </a:r>
+            <a:r>
+              <a:rPr lang="en-US" dirty="0" smtClean="0"/>
+              <a:t>Add Migration </a:t>
+            </a:r>
+            <a:r>
+              <a:rPr lang="ar-JO" dirty="0" smtClean="0"/>
+              <a:t> فقط ولم يعجبك, بامكانك  حذف الكلاس الناتج</a:t>
+            </a:r>
+          </a:p>
+          <a:p>
+            <a:pPr marL="285750" indent="-285750" algn="r" rtl="1">
+              <a:buFont typeface="Arial" panose="020B0604020202020204" pitchFamily="34" charset="0"/>
+              <a:buChar char="•"/>
+            </a:pPr>
+            <a:r>
+              <a:rPr lang="ar-JO" dirty="0" smtClean="0"/>
+              <a:t>اذا عملت </a:t>
+            </a:r>
+            <a:r>
+              <a:rPr lang="en-US" dirty="0" smtClean="0"/>
+              <a:t>Add Migration </a:t>
+            </a:r>
+            <a:r>
+              <a:rPr lang="ar-JO" dirty="0"/>
+              <a:t> </a:t>
+            </a:r>
+            <a:r>
+              <a:rPr lang="ar-JO" dirty="0" smtClean="0"/>
+              <a:t>ثم </a:t>
+            </a:r>
+            <a:r>
+              <a:rPr lang="en-US" dirty="0" smtClean="0"/>
+              <a:t>Update </a:t>
+            </a:r>
+            <a:r>
+              <a:rPr lang="en-US" dirty="0" err="1" smtClean="0"/>
+              <a:t>Datbase</a:t>
+            </a:r>
+            <a:r>
+              <a:rPr lang="en-US" dirty="0" smtClean="0"/>
+              <a:t> </a:t>
+            </a:r>
+            <a:r>
+              <a:rPr lang="ar-JO" dirty="0"/>
+              <a:t> </a:t>
+            </a:r>
+            <a:r>
+              <a:rPr lang="ar-JO" dirty="0" smtClean="0"/>
+              <a:t>ثم لم يعجبك, بامكانك اما العودة للميجريشن السابق باستخدام </a:t>
+            </a:r>
+          </a:p>
+          <a:p>
+            <a:pPr lvl="1" algn="r" rtl="1"/>
+            <a:r>
+              <a:rPr lang="en-US" dirty="0"/>
+              <a:t>update-database   -</a:t>
+            </a:r>
+            <a:r>
+              <a:rPr lang="en-US" dirty="0" err="1"/>
+              <a:t>TargetMigration</a:t>
+            </a:r>
+            <a:r>
+              <a:rPr lang="en-US" dirty="0"/>
+              <a:t>:"</a:t>
+            </a:r>
+            <a:r>
+              <a:rPr lang="en-US" dirty="0" err="1" smtClean="0"/>
+              <a:t>name_of_migration</a:t>
+            </a:r>
+            <a:r>
+              <a:rPr lang="en-US" dirty="0" smtClean="0"/>
+              <a:t>«</a:t>
+            </a:r>
+            <a:endParaRPr lang="ar-JO" dirty="0" smtClean="0"/>
+          </a:p>
+          <a:p>
+            <a:pPr lvl="1" algn="r" rtl="1"/>
+            <a:r>
+              <a:rPr lang="ar-JO" dirty="0" smtClean="0"/>
+              <a:t>ثم حذف الكلاس الناتج او حذف الداتا بيس كاملة ثم حذف الكلاس الناتج </a:t>
+            </a:r>
+          </a:p>
+          <a:p>
+            <a:pPr marL="285750" indent="-285750" algn="r" rtl="1">
+              <a:buFont typeface="Arial" panose="020B0604020202020204" pitchFamily="34" charset="0"/>
+              <a:buChar char="•"/>
+            </a:pPr>
+            <a:r>
+              <a:rPr lang="ar-JO" dirty="0" smtClean="0"/>
+              <a:t>اذا عملت </a:t>
+            </a:r>
+            <a:r>
+              <a:rPr lang="en-US" dirty="0" smtClean="0"/>
+              <a:t>Add Migration </a:t>
+            </a:r>
+            <a:r>
+              <a:rPr lang="ar-JO" dirty="0"/>
+              <a:t> </a:t>
+            </a:r>
+            <a:r>
+              <a:rPr lang="ar-JO" dirty="0" smtClean="0"/>
+              <a:t>ثم عملت </a:t>
+            </a:r>
+            <a:r>
+              <a:rPr lang="en-US" dirty="0" smtClean="0"/>
+              <a:t>commit and push </a:t>
+            </a:r>
+            <a:r>
+              <a:rPr lang="ar-JO" dirty="0"/>
+              <a:t> </a:t>
+            </a:r>
+            <a:r>
+              <a:rPr lang="ar-JO" dirty="0" smtClean="0"/>
+              <a:t>للكود على ال </a:t>
+            </a:r>
+            <a:r>
+              <a:rPr lang="en-US" dirty="0" err="1" smtClean="0"/>
+              <a:t>Git</a:t>
+            </a:r>
+            <a:r>
+              <a:rPr lang="ar-JO" dirty="0" smtClean="0"/>
+              <a:t>, لا يمكن ابدا حذف اخر </a:t>
+            </a:r>
+            <a:r>
+              <a:rPr lang="en-US" dirty="0" smtClean="0"/>
+              <a:t>migration </a:t>
+            </a:r>
+            <a:r>
+              <a:rPr lang="ar-JO" dirty="0" smtClean="0"/>
+              <a:t>او الكلاس الناتج, اياك ثم اياك</a:t>
+            </a:r>
+          </a:p>
+          <a:p>
+            <a:pPr marL="285750" indent="-285750" algn="r" rtl="1">
+              <a:buFont typeface="Arial" panose="020B0604020202020204" pitchFamily="34" charset="0"/>
+              <a:buChar char="•"/>
+            </a:pPr>
+            <a:endParaRPr lang="ar-JO" dirty="0" smtClean="0"/>
+          </a:p>
+          <a:p>
+            <a:pPr marL="285750" indent="-285750" algn="r" rtl="1">
+              <a:buFont typeface="Arial" panose="020B0604020202020204" pitchFamily="34" charset="0"/>
+              <a:buChar char="•"/>
+            </a:pPr>
+            <a:r>
+              <a:rPr lang="ar-JO" dirty="0"/>
+              <a:t>يمكن استخدام </a:t>
+            </a:r>
+            <a:r>
+              <a:rPr lang="en-US" dirty="0"/>
+              <a:t>     Update-Database –Script </a:t>
+            </a:r>
+            <a:r>
+              <a:rPr lang="ar-JO" dirty="0"/>
+              <a:t>لعمل ملف </a:t>
+            </a:r>
+            <a:r>
+              <a:rPr lang="en-US" dirty="0"/>
+              <a:t>SQL </a:t>
+            </a:r>
+            <a:r>
+              <a:rPr lang="ar-JO" dirty="0"/>
+              <a:t>بدلا من تحديث قاعدة البانات بشكل مباشر</a:t>
+            </a:r>
+            <a:endParaRPr lang="en-US" dirty="0"/>
+          </a:p>
+          <a:p>
+            <a:pPr marL="285750" indent="-285750" algn="r" rtl="1">
+              <a:buFont typeface="Arial" panose="020B0604020202020204" pitchFamily="34" charset="0"/>
+              <a:buChar char="•"/>
+            </a:pPr>
+            <a:r>
+              <a:rPr lang="ar-JO" dirty="0" smtClean="0"/>
+              <a:t>يرجى </a:t>
+            </a:r>
+            <a:r>
+              <a:rPr lang="ar-JO" dirty="0"/>
+              <a:t>الانتباه الى جدول </a:t>
+            </a:r>
+            <a:r>
+              <a:rPr lang="en-US" dirty="0"/>
+              <a:t>__</a:t>
+            </a:r>
+            <a:r>
+              <a:rPr lang="en-US" dirty="0" err="1"/>
+              <a:t>MigrationHistory</a:t>
+            </a:r>
+            <a:r>
+              <a:rPr lang="ar-JO" dirty="0"/>
+              <a:t> في قاعدة </a:t>
+            </a:r>
+            <a:r>
+              <a:rPr lang="ar-JO" dirty="0" smtClean="0"/>
+              <a:t>البيانات</a:t>
+            </a:r>
+          </a:p>
+        </p:txBody>
+      </p:sp>
+    </p:spTree>
+    <p:extLst>
+      <p:ext uri="{BB962C8B-B14F-4D97-AF65-F5344CB8AC3E}">
+        <p14:creationId xmlns:p14="http://schemas.microsoft.com/office/powerpoint/2010/main" val="913368434"/>
       </p:ext>
     </p:extLst>
   </p:cSld>
@@ -15855,7 +16480,7 @@
             </a:pPr>
             <a:r>
               <a:rPr lang="en-US" dirty="0" smtClean="0"/>
-              <a:t>Caching </a:t>
+              <a:t>Migrations</a:t>
             </a:r>
             <a:endParaRPr lang="en-US" dirty="0" smtClean="0"/>
           </a:p>
@@ -15865,8 +16490,8 @@
               <a:buAutoNum type="arabicPeriod"/>
             </a:pPr>
             <a:r>
-              <a:rPr lang="en-US" dirty="0" smtClean="0"/>
-              <a:t>Migrations</a:t>
+              <a:rPr lang="en-US" dirty="0"/>
+              <a:t>Caching </a:t>
             </a:r>
             <a:endParaRPr lang="en-US" dirty="0" smtClean="0"/>
           </a:p>
@@ -15879,6 +16504,7 @@
               <a:rPr lang="en-US" dirty="0" smtClean="0"/>
               <a:t>Repository</a:t>
             </a:r>
+            <a:endParaRPr lang="en-US" dirty="0" smtClean="0"/>
           </a:p>
         </p:txBody>
       </p:sp>

</xml_diff>